<commit_message>
reference project sql code
</commit_message>
<xml_diff>
--- a/mms-ent/docs/MMS using ES + PG.pptx
+++ b/mms-ent/docs/MMS using ES + PG.pptx
@@ -11916,6 +11916,13 @@
   <p:clrMapOvr>
     <a:masterClrMapping/>
   </p:clrMapOvr>
+  <p:timing>
+    <p:tnLst>
+      <p:par>
+        <p:cTn id="1" dur="indefinite" restart="never" nodeType="tmRoot"/>
+      </p:par>
+    </p:tnLst>
+  </p:timing>
 </p:sld>
 </file>
 
@@ -12074,6 +12081,13 @@
   <p:clrMapOvr>
     <a:masterClrMapping/>
   </p:clrMapOvr>
+  <p:timing>
+    <p:tnLst>
+      <p:par>
+        <p:cTn id="1" dur="indefinite" restart="never" nodeType="tmRoot"/>
+      </p:par>
+    </p:tnLst>
+  </p:timing>
 </p:sld>
 </file>
 
@@ -12206,6 +12220,13 @@
   <p:clrMapOvr>
     <a:masterClrMapping/>
   </p:clrMapOvr>
+  <p:timing>
+    <p:tnLst>
+      <p:par>
+        <p:cTn id="1" dur="indefinite" restart="never" nodeType="tmRoot"/>
+      </p:par>
+    </p:tnLst>
+  </p:timing>
 </p:sld>
 </file>
 
@@ -12330,6 +12351,13 @@
   <p:clrMapOvr>
     <a:masterClrMapping/>
   </p:clrMapOvr>
+  <p:timing>
+    <p:tnLst>
+      <p:par>
+        <p:cTn id="1" dur="indefinite" restart="never" nodeType="tmRoot"/>
+      </p:par>
+    </p:tnLst>
+  </p:timing>
 </p:sld>
 </file>
 
@@ -12474,6 +12502,13 @@
   <p:clrMapOvr>
     <a:masterClrMapping/>
   </p:clrMapOvr>
+  <p:timing>
+    <p:tnLst>
+      <p:par>
+        <p:cTn id="1" dur="indefinite" restart="never" nodeType="tmRoot"/>
+      </p:par>
+    </p:tnLst>
+  </p:timing>
 </p:sld>
 </file>
 
@@ -13463,6 +13498,13 @@
   <p:clrMapOvr>
     <a:masterClrMapping/>
   </p:clrMapOvr>
+  <p:timing>
+    <p:tnLst>
+      <p:par>
+        <p:cTn id="1" dur="indefinite" restart="never" nodeType="tmRoot"/>
+      </p:par>
+    </p:tnLst>
+  </p:timing>
 </p:sld>
 </file>
 
@@ -13519,7 +13561,7 @@
         <p:spPr/>
         <p:txBody>
           <a:bodyPr>
-            <a:normAutofit lnSpcReduction="10000"/>
+            <a:normAutofit fontScale="92500" lnSpcReduction="20000"/>
           </a:bodyPr>
           <a:lstStyle/>
           <a:p>
@@ -13547,7 +13589,11 @@
           <a:p>
             <a:r>
               <a:rPr lang="en-US" dirty="0" smtClean="0"/>
-              <a:t>Schema defined in </a:t>
+              <a:t>Orgs Schema </a:t>
+            </a:r>
+            <a:r>
+              <a:rPr lang="en-US" dirty="0" smtClean="0"/>
+              <a:t>defined in </a:t>
             </a:r>
             <a:r>
               <a:rPr lang="en-US" dirty="0" err="1" smtClean="0"/>
@@ -13557,6 +13603,20 @@
               <a:rPr lang="en-US" dirty="0" smtClean="0"/>
               <a:t>, each “project” has its own DB</a:t>
             </a:r>
+          </a:p>
+          <a:p>
+            <a:r>
+              <a:rPr lang="en-US" dirty="0" smtClean="0"/>
+              <a:t>Also see </a:t>
+            </a:r>
+            <a:r>
+              <a:rPr lang="en-US" dirty="0" err="1" smtClean="0"/>
+              <a:t>PostgresHelper.createProjectTables</a:t>
+            </a:r>
+            <a:r>
+              <a:rPr lang="en-US" smtClean="0"/>
+              <a:t>()</a:t>
+            </a:r>
             <a:endParaRPr lang="en-US" dirty="0" smtClean="0"/>
           </a:p>
           <a:p>
@@ -13565,6 +13625,7 @@
               <a:rPr lang="en-US" dirty="0" smtClean="0"/>
               <a:t>Nodes</a:t>
             </a:r>
+            <a:endParaRPr lang="en-US" dirty="0" smtClean="0"/>
           </a:p>
           <a:p>
             <a:pPr lvl="1"/>
@@ -13624,6 +13685,13 @@
   <p:clrMapOvr>
     <a:masterClrMapping/>
   </p:clrMapOvr>
+  <p:timing>
+    <p:tnLst>
+      <p:par>
+        <p:cTn id="1" dur="indefinite" restart="never" nodeType="tmRoot"/>
+      </p:par>
+    </p:tnLst>
+  </p:timing>
 </p:sld>
 </file>
 
@@ -13796,6 +13864,13 @@
   <p:clrMapOvr>
     <a:masterClrMapping/>
   </p:clrMapOvr>
+  <p:timing>
+    <p:tnLst>
+      <p:par>
+        <p:cTn id="1" dur="indefinite" restart="never" nodeType="tmRoot"/>
+      </p:par>
+    </p:tnLst>
+  </p:timing>
 </p:sld>
 </file>
 
@@ -13944,6 +14019,13 @@
   <p:clrMapOvr>
     <a:masterClrMapping/>
   </p:clrMapOvr>
+  <p:timing>
+    <p:tnLst>
+      <p:par>
+        <p:cTn id="1" dur="indefinite" restart="never" nodeType="tmRoot"/>
+      </p:par>
+    </p:tnLst>
+  </p:timing>
 </p:sld>
 </file>
 
@@ -14064,6 +14146,13 @@
   <p:clrMapOvr>
     <a:masterClrMapping/>
   </p:clrMapOvr>
+  <p:timing>
+    <p:tnLst>
+      <p:par>
+        <p:cTn id="1" dur="indefinite" restart="never" nodeType="tmRoot"/>
+      </p:par>
+    </p:tnLst>
+  </p:timing>
 </p:sld>
 </file>
 
@@ -14203,6 +14292,13 @@
   <p:clrMapOvr>
     <a:masterClrMapping/>
   </p:clrMapOvr>
+  <p:timing>
+    <p:tnLst>
+      <p:par>
+        <p:cTn id="1" dur="indefinite" restart="never" nodeType="tmRoot"/>
+      </p:par>
+    </p:tnLst>
+  </p:timing>
 </p:sld>
 </file>
 
@@ -14457,6 +14553,13 @@
   <p:clrMapOvr>
     <a:masterClrMapping/>
   </p:clrMapOvr>
+  <p:timing>
+    <p:tnLst>
+      <p:par>
+        <p:cTn id="1" dur="indefinite" restart="never" nodeType="tmRoot"/>
+      </p:par>
+    </p:tnLst>
+  </p:timing>
 </p:sld>
 </file>
 
@@ -14611,6 +14714,13 @@
   <p:clrMapOvr>
     <a:masterClrMapping/>
   </p:clrMapOvr>
+  <p:timing>
+    <p:tnLst>
+      <p:par>
+        <p:cTn id="1" dur="indefinite" restart="never" nodeType="tmRoot"/>
+      </p:par>
+    </p:tnLst>
+  </p:timing>
 </p:sld>
 </file>
 

</xml_diff>